<commit_message>
With answers to open questions
</commit_message>
<xml_diff>
--- a/docs/planning-kickoff.pptx
+++ b/docs/planning-kickoff.pptx
@@ -4274,7 +4274,7 @@
         </p:nvSpPr>
         <p:spPr>
           <a:xfrm>
-            <a:off x="5338761" y="5680955"/>
+            <a:off x="5348489" y="5680955"/>
             <a:ext cx="800220" cy="461665"/>
           </a:xfrm>
           <a:prstGeom prst="rect">
@@ -4502,6 +4502,79 @@
           </a:p>
         </p:txBody>
       </p:sp>
+      <p:cxnSp>
+        <p:nvCxnSpPr>
+          <p:cNvPr id="22" name="Straight Connector 21"/>
+          <p:cNvCxnSpPr/>
+          <p:nvPr/>
+        </p:nvCxnSpPr>
+        <p:spPr>
+          <a:xfrm flipV="1">
+            <a:off x="6129118" y="5136205"/>
+            <a:ext cx="0" cy="447473"/>
+          </a:xfrm>
+          <a:prstGeom prst="line">
+            <a:avLst/>
+          </a:prstGeom>
+        </p:spPr>
+        <p:style>
+          <a:lnRef idx="1">
+            <a:schemeClr val="accent1"/>
+          </a:lnRef>
+          <a:fillRef idx="0">
+            <a:schemeClr val="accent1"/>
+          </a:fillRef>
+          <a:effectRef idx="0">
+            <a:schemeClr val="accent1"/>
+          </a:effectRef>
+          <a:fontRef idx="minor">
+            <a:schemeClr val="tx1"/>
+          </a:fontRef>
+        </p:style>
+      </p:cxnSp>
+      <p:sp>
+        <p:nvSpPr>
+          <p:cNvPr id="23" name="TextBox 22"/>
+          <p:cNvSpPr txBox="1"/>
+          <p:nvPr/>
+        </p:nvSpPr>
+        <p:spPr>
+          <a:xfrm>
+            <a:off x="5729339" y="4584755"/>
+            <a:ext cx="857927" cy="461665"/>
+          </a:xfrm>
+          <a:prstGeom prst="rect">
+            <a:avLst/>
+          </a:prstGeom>
+          <a:noFill/>
+        </p:spPr>
+        <p:txBody>
+          <a:bodyPr wrap="none" rtlCol="0">
+            <a:spAutoFit/>
+          </a:bodyPr>
+          <a:lstStyle/>
+          <a:p>
+            <a:pPr algn="ctr"/>
+            <a:r>
+              <a:rPr lang="en-US" sz="1200" dirty="0" smtClean="0"/>
+              <a:t>SR Summit</a:t>
+            </a:r>
+            <a:endParaRPr lang="en-US" sz="1200" dirty="0" smtClean="0"/>
+          </a:p>
+          <a:p>
+            <a:pPr algn="ctr"/>
+            <a:r>
+              <a:rPr lang="en-US" sz="1200" dirty="0" smtClean="0"/>
+              <a:t>(</a:t>
+            </a:r>
+            <a:r>
+              <a:rPr lang="en-US" sz="1200" dirty="0" smtClean="0"/>
+              <a:t>9/20-21)</a:t>
+            </a:r>
+            <a:endParaRPr lang="en-US" sz="1200" dirty="0"/>
+          </a:p>
+        </p:txBody>
+      </p:sp>
     </p:spTree>
     <p:extLst>
       <p:ext uri="{BB962C8B-B14F-4D97-AF65-F5344CB8AC3E}">
@@ -4572,14 +4645,14 @@
             <p:ph idx="1"/>
             <p:extLst>
               <p:ext uri="{D42A27DB-BD31-4B8C-83A1-F6EECF244321}">
-                <p14:modId xmlns:p14="http://schemas.microsoft.com/office/powerpoint/2010/main" val="1117428003"/>
+                <p14:modId xmlns:p14="http://schemas.microsoft.com/office/powerpoint/2010/main" val="842284308"/>
               </p:ext>
             </p:extLst>
           </p:nvPr>
         </p:nvGraphicFramePr>
         <p:xfrm>
           <a:off x="838200" y="1001950"/>
-          <a:ext cx="10515600" cy="5085080"/>
+          <a:ext cx="10515600" cy="5455920"/>
         </p:xfrm>
         <a:graphic>
           <a:graphicData uri="http://schemas.openxmlformats.org/drawingml/2006/table">
@@ -4700,22 +4773,42 @@
                         <a:defRPr/>
                       </a:pPr>
                       <a:r>
-                        <a:rPr lang="en-US" sz="1400" dirty="0" smtClean="0"/>
+                        <a:rPr lang="en-US" sz="1400" dirty="0" smtClean="0">
+                          <a:solidFill>
+                            <a:schemeClr val="accent6"/>
+                          </a:solidFill>
+                        </a:rPr>
                         <a:t>k8s + </a:t>
                       </a:r>
                       <a:r>
-                        <a:rPr lang="en-US" sz="1400" dirty="0" err="1" smtClean="0"/>
+                        <a:rPr lang="en-US" sz="1400" dirty="0" err="1" smtClean="0">
+                          <a:solidFill>
+                            <a:schemeClr val="accent6"/>
+                          </a:solidFill>
+                        </a:rPr>
                         <a:t>OpenShift</a:t>
                       </a:r>
                       <a:r>
-                        <a:rPr lang="en-US" sz="1400" dirty="0" smtClean="0"/>
+                        <a:rPr lang="en-US" sz="1400" dirty="0" smtClean="0">
+                          <a:solidFill>
+                            <a:schemeClr val="accent6"/>
+                          </a:solidFill>
+                        </a:rPr>
                         <a:t> but support for anything vanilla,</a:t>
                       </a:r>
                       <a:r>
-                        <a:rPr lang="en-US" sz="1400" baseline="0" dirty="0" smtClean="0"/>
+                        <a:rPr lang="en-US" sz="1400" baseline="0" dirty="0" smtClean="0">
+                          <a:solidFill>
+                            <a:schemeClr val="accent6"/>
+                          </a:solidFill>
+                        </a:rPr>
                         <a:t> running on AWS</a:t>
                       </a:r>
-                      <a:endParaRPr lang="en-US" sz="1400" dirty="0" smtClean="0"/>
+                      <a:endParaRPr lang="en-US" sz="1400" dirty="0" smtClean="0">
+                        <a:solidFill>
+                          <a:schemeClr val="accent6"/>
+                        </a:solidFill>
+                      </a:endParaRPr>
                     </a:p>
                   </a:txBody>
                   <a:tcPr/>
@@ -4771,7 +4864,20 @@
                     <a:bodyPr/>
                     <a:lstStyle/>
                     <a:p>
-                      <a:endParaRPr lang="en-US" sz="1400" dirty="0"/>
+                      <a:r>
+                        <a:rPr lang="en-US" sz="1400" dirty="0" smtClean="0">
+                          <a:solidFill>
+                            <a:schemeClr val="accent6"/>
+                          </a:solidFill>
+                          <a:sym typeface="Wingdings"/>
+                        </a:rPr>
+                        <a:t></a:t>
+                      </a:r>
+                      <a:endParaRPr lang="en-US" sz="1400" dirty="0">
+                        <a:solidFill>
+                          <a:schemeClr val="accent6"/>
+                        </a:solidFill>
+                      </a:endParaRPr>
                     </a:p>
                   </a:txBody>
                   <a:tcPr/>
@@ -4815,7 +4921,19 @@
                     <a:bodyPr/>
                     <a:lstStyle/>
                     <a:p>
-                      <a:endParaRPr lang="en-US" sz="1400" dirty="0"/>
+                      <a:r>
+                        <a:rPr lang="en-US" sz="1400" dirty="0" smtClean="0">
+                          <a:solidFill>
+                            <a:schemeClr val="accent6"/>
+                          </a:solidFill>
+                        </a:rPr>
+                        <a:t>IBC Demo and DC BAF balancer</a:t>
+                      </a:r>
+                      <a:endParaRPr lang="en-US" sz="1400" dirty="0">
+                        <a:solidFill>
+                          <a:schemeClr val="accent6"/>
+                        </a:solidFill>
+                      </a:endParaRPr>
                     </a:p>
                   </a:txBody>
                   <a:tcPr/>
@@ -4859,7 +4977,20 @@
                     <a:bodyPr/>
                     <a:lstStyle/>
                     <a:p>
-                      <a:endParaRPr lang="en-US" sz="1400" dirty="0"/>
+                      <a:r>
+                        <a:rPr lang="en-US" sz="1400" dirty="0" smtClean="0">
+                          <a:solidFill>
+                            <a:schemeClr val="accent6"/>
+                          </a:solidFill>
+                          <a:sym typeface="Wingdings"/>
+                        </a:rPr>
+                        <a:t></a:t>
+                      </a:r>
+                      <a:endParaRPr lang="en-US" sz="1400" dirty="0">
+                        <a:solidFill>
+                          <a:schemeClr val="accent6"/>
+                        </a:solidFill>
+                      </a:endParaRPr>
                     </a:p>
                   </a:txBody>
                   <a:tcPr/>
@@ -4899,7 +5030,31 @@
                     <a:bodyPr/>
                     <a:lstStyle/>
                     <a:p>
-                      <a:endParaRPr lang="en-US" sz="1400" dirty="0"/>
+                      <a:pPr marL="0" marR="0" indent="0" algn="l" defTabSz="914400" rtl="0" eaLnBrk="1" fontAlgn="auto" latinLnBrk="0" hangingPunct="1">
+                        <a:lnSpc>
+                          <a:spcPct val="100000"/>
+                        </a:lnSpc>
+                        <a:spcBef>
+                          <a:spcPts val="0"/>
+                        </a:spcBef>
+                        <a:spcAft>
+                          <a:spcPts val="0"/>
+                        </a:spcAft>
+                        <a:buClrTx/>
+                        <a:buSzTx/>
+                        <a:buFontTx/>
+                        <a:buNone/>
+                        <a:tabLst/>
+                        <a:defRPr/>
+                      </a:pPr>
+                      <a:r>
+                        <a:rPr lang="en-US" sz="1400" dirty="0" smtClean="0">
+                          <a:solidFill>
+                            <a:schemeClr val="accent6"/>
+                          </a:solidFill>
+                        </a:rPr>
+                        <a:t>100 routers, 300 SIDs, 300 hosts</a:t>
+                      </a:r>
                     </a:p>
                   </a:txBody>
                   <a:tcPr/>
@@ -4943,6 +5098,10 @@
                     <a:bodyPr/>
                     <a:lstStyle/>
                     <a:p>
+                      <a:r>
+                        <a:rPr lang="en-US" sz="1400" dirty="0" smtClean="0"/>
+                        <a:t>TBD, probably scalable without extra thought</a:t>
+                      </a:r>
                       <a:endParaRPr lang="en-US" sz="1400" dirty="0"/>
                     </a:p>
                   </a:txBody>
@@ -4957,11 +5116,11 @@
                     <a:p>
                       <a:r>
                         <a:rPr lang="en-US" sz="1400" dirty="0" smtClean="0"/>
-                        <a:t>Footprint</a:t>
+                        <a:t>Performance: Latency bounds</a:t>
                       </a:r>
                       <a:r>
                         <a:rPr lang="en-US" sz="1400" baseline="0" dirty="0" smtClean="0"/>
-                        <a:t> constraints?</a:t>
+                        <a:t> on API calls</a:t>
                       </a:r>
                       <a:endParaRPr lang="en-US" sz="1400" dirty="0"/>
                     </a:p>
@@ -4973,14 +5132,6 @@
                     <a:bodyPr/>
                     <a:lstStyle/>
                     <a:p>
-                      <a:r>
-                        <a:rPr lang="en-US" sz="1400" dirty="0" smtClean="0"/>
-                        <a:t>Target an AIO instance for</a:t>
-                      </a:r>
-                      <a:r>
-                        <a:rPr lang="en-US" sz="1400" baseline="0" dirty="0" smtClean="0"/>
-                        <a:t> 16 cores and however much memory makes sense based on VM sizing.</a:t>
-                      </a:r>
                       <a:endParaRPr lang="en-US" sz="1400" dirty="0"/>
                     </a:p>
                   </a:txBody>
@@ -4991,7 +5142,27 @@
                     <a:bodyPr/>
                     <a:lstStyle/>
                     <a:p>
-                      <a:endParaRPr lang="en-US" sz="1400" dirty="0"/>
+                      <a:r>
+                        <a:rPr lang="en-US" sz="1400" dirty="0" smtClean="0">
+                          <a:solidFill>
+                            <a:schemeClr val="accent6"/>
+                          </a:solidFill>
+                        </a:rPr>
+                        <a:t>All API calls make round trip</a:t>
+                      </a:r>
+                      <a:r>
+                        <a:rPr lang="en-US" sz="1400" baseline="0" dirty="0" smtClean="0">
+                          <a:solidFill>
+                            <a:schemeClr val="accent6"/>
+                          </a:solidFill>
+                        </a:rPr>
+                        <a:t> to cloud</a:t>
+                      </a:r>
+                      <a:endParaRPr lang="en-US" sz="1400" dirty="0">
+                        <a:solidFill>
+                          <a:schemeClr val="accent6"/>
+                        </a:solidFill>
+                      </a:endParaRPr>
                     </a:p>
                   </a:txBody>
                   <a:tcPr/>
@@ -5005,7 +5176,11 @@
                     <a:p>
                       <a:r>
                         <a:rPr lang="en-US" sz="1400" dirty="0" smtClean="0"/>
-                        <a:t>Project organization: how many people?</a:t>
+                        <a:t>Footprint</a:t>
+                      </a:r>
+                      <a:r>
+                        <a:rPr lang="en-US" sz="1400" baseline="0" dirty="0" smtClean="0"/>
+                        <a:t> constraints?</a:t>
                       </a:r>
                       <a:endParaRPr lang="en-US" sz="1400" dirty="0"/>
                     </a:p>
@@ -5019,7 +5194,15 @@
                     <a:p>
                       <a:r>
                         <a:rPr lang="en-US" sz="1400" dirty="0" smtClean="0"/>
-                        <a:t>TBD based on architecture</a:t>
+                        <a:t>Target an AIO instance for</a:t>
+                      </a:r>
+                      <a:r>
+                        <a:rPr lang="en-US" sz="1400" baseline="0" dirty="0" smtClean="0"/>
+                        <a:t> 16 cores and however much memory makes sense based on VM </a:t>
+                      </a:r>
+                      <a:r>
+                        <a:rPr lang="en-US" sz="1400" baseline="0" dirty="0" smtClean="0"/>
+                        <a:t>sizing on chosen platform.</a:t>
                       </a:r>
                       <a:endParaRPr lang="en-US" sz="1400" dirty="0"/>
                     </a:p>
@@ -5031,7 +5214,27 @@
                     <a:bodyPr/>
                     <a:lstStyle/>
                     <a:p>
-                      <a:endParaRPr lang="en-US" sz="1400" dirty="0"/>
+                      <a:r>
+                        <a:rPr lang="en-US" sz="1400" dirty="0" smtClean="0">
+                          <a:solidFill>
+                            <a:schemeClr val="accent6"/>
+                          </a:solidFill>
+                        </a:rPr>
+                        <a:t>Small/medium machines for servicing API requests, larger</a:t>
+                      </a:r>
+                      <a:r>
+                        <a:rPr lang="en-US" sz="1400" baseline="0" dirty="0" smtClean="0">
+                          <a:solidFill>
+                            <a:schemeClr val="accent6"/>
+                          </a:solidFill>
+                        </a:rPr>
+                        <a:t> VMs for backend</a:t>
+                      </a:r>
+                      <a:endParaRPr lang="en-US" sz="1400" dirty="0">
+                        <a:solidFill>
+                          <a:schemeClr val="accent6"/>
+                        </a:solidFill>
+                      </a:endParaRPr>
                     </a:p>
                   </a:txBody>
                   <a:tcPr/>
@@ -5045,11 +5248,7 @@
                     <a:p>
                       <a:r>
                         <a:rPr lang="en-US" sz="1400" dirty="0" smtClean="0"/>
-                        <a:t>Project</a:t>
-                      </a:r>
-                      <a:r>
-                        <a:rPr lang="en-US" sz="1400" baseline="0" dirty="0" smtClean="0"/>
-                        <a:t> organization: sprint durations?</a:t>
+                        <a:t>Project organization: how many people?</a:t>
                       </a:r>
                       <a:endParaRPr lang="en-US" sz="1400" dirty="0"/>
                     </a:p>
@@ -5063,11 +5262,7 @@
                     <a:p>
                       <a:r>
                         <a:rPr lang="en-US" sz="1400" dirty="0" smtClean="0"/>
-                        <a:t>3 weeks because</a:t>
-                      </a:r>
-                      <a:r>
-                        <a:rPr lang="en-US" sz="1400" baseline="0" dirty="0" smtClean="0"/>
-                        <a:t> summertime</a:t>
+                        <a:t>TBD based on architecture</a:t>
                       </a:r>
                       <a:endParaRPr lang="en-US" sz="1400" dirty="0"/>
                     </a:p>
@@ -5080,6 +5275,74 @@
                     <a:lstStyle/>
                     <a:p>
                       <a:endParaRPr lang="en-US" sz="1400" dirty="0"/>
+                    </a:p>
+                  </a:txBody>
+                  <a:tcPr/>
+                </a:tc>
+              </a:tr>
+              <a:tr h="370840">
+                <a:tc>
+                  <a:txBody>
+                    <a:bodyPr/>
+                    <a:lstStyle/>
+                    <a:p>
+                      <a:r>
+                        <a:rPr lang="en-US" sz="1400" dirty="0" smtClean="0"/>
+                        <a:t>Project</a:t>
+                      </a:r>
+                      <a:r>
+                        <a:rPr lang="en-US" sz="1400" baseline="0" dirty="0" smtClean="0"/>
+                        <a:t> organization: sprint durations?</a:t>
+                      </a:r>
+                      <a:endParaRPr lang="en-US" sz="1400" dirty="0"/>
+                    </a:p>
+                  </a:txBody>
+                  <a:tcPr/>
+                </a:tc>
+                <a:tc>
+                  <a:txBody>
+                    <a:bodyPr/>
+                    <a:lstStyle/>
+                    <a:p>
+                      <a:r>
+                        <a:rPr lang="en-US" sz="1400" dirty="0" smtClean="0"/>
+                        <a:t>3 weeks because</a:t>
+                      </a:r>
+                      <a:r>
+                        <a:rPr lang="en-US" sz="1400" baseline="0" dirty="0" smtClean="0"/>
+                        <a:t> summertime</a:t>
+                      </a:r>
+                      <a:endParaRPr lang="en-US" sz="1400" dirty="0"/>
+                    </a:p>
+                  </a:txBody>
+                  <a:tcPr/>
+                </a:tc>
+                <a:tc>
+                  <a:txBody>
+                    <a:bodyPr/>
+                    <a:lstStyle/>
+                    <a:p>
+                      <a:r>
+                        <a:rPr lang="en-US" sz="1400" dirty="0" smtClean="0">
+                          <a:solidFill>
+                            <a:schemeClr val="accent6"/>
+                          </a:solidFill>
+                        </a:rPr>
+                        <a:t>2 weeks</a:t>
+                      </a:r>
+                      <a:r>
+                        <a:rPr lang="en-US" sz="1400" baseline="0" dirty="0" smtClean="0">
+                          <a:solidFill>
+                            <a:schemeClr val="accent6"/>
+                          </a:solidFill>
+                        </a:rPr>
+                        <a:t> suggested</a:t>
+                      </a:r>
+                      <a:endParaRPr lang="en-US" sz="1400" dirty="0">
+                        <a:solidFill>
+                          <a:schemeClr val="accent6"/>
+                        </a:solidFill>
+                      </a:endParaRPr>
                     </a:p>
                   </a:txBody>
                   <a:tcPr/>
@@ -5159,14 +5422,14 @@
             <p:ph idx="1"/>
             <p:extLst>
               <p:ext uri="{D42A27DB-BD31-4B8C-83A1-F6EECF244321}">
-                <p14:modId xmlns:p14="http://schemas.microsoft.com/office/powerpoint/2010/main" val="1772637519"/>
+                <p14:modId xmlns:p14="http://schemas.microsoft.com/office/powerpoint/2010/main" val="1115057187"/>
               </p:ext>
             </p:extLst>
           </p:nvPr>
         </p:nvGraphicFramePr>
         <p:xfrm>
           <a:off x="838200" y="1001950"/>
-          <a:ext cx="10515600" cy="4445000"/>
+          <a:ext cx="10515600" cy="5593080"/>
         </p:xfrm>
         <a:graphic>
           <a:graphicData uri="http://schemas.openxmlformats.org/drawingml/2006/table">
@@ -5269,7 +5532,59 @@
                     <a:bodyPr/>
                     <a:lstStyle/>
                     <a:p>
-                      <a:endParaRPr lang="en-US" sz="1400" dirty="0"/>
+                      <a:r>
+                        <a:rPr lang="en-US" sz="1400" dirty="0" smtClean="0">
+                          <a:solidFill>
+                            <a:schemeClr val="accent6"/>
+                          </a:solidFill>
+                        </a:rPr>
+                        <a:t>2</a:t>
+                      </a:r>
+                      <a:r>
+                        <a:rPr lang="en-US" sz="1400" baseline="0" dirty="0" smtClean="0">
+                          <a:solidFill>
+                            <a:schemeClr val="accent6"/>
+                          </a:solidFill>
+                        </a:rPr>
+                        <a:t> parts: generic logic to interact with Voltron, custom programmer for destination environment (k8s vs. VPP vs. Linux) </a:t>
+                      </a:r>
+                      <a:r>
+                        <a:rPr lang="mr-IN" sz="1400" baseline="0" dirty="0" smtClean="0">
+                          <a:solidFill>
+                            <a:schemeClr val="accent6"/>
+                          </a:solidFill>
+                        </a:rPr>
+                        <a:t>–</a:t>
+                      </a:r>
+                      <a:r>
+                        <a:rPr lang="en-US" sz="1400" baseline="0" dirty="0" smtClean="0">
+                          <a:solidFill>
+                            <a:schemeClr val="accent6"/>
+                          </a:solidFill>
+                        </a:rPr>
+                        <a:t> reuse </a:t>
+                      </a:r>
+                      <a:r>
+                        <a:rPr lang="en-US" sz="1400" baseline="0" dirty="0" err="1" smtClean="0">
+                          <a:solidFill>
+                            <a:schemeClr val="accent6"/>
+                          </a:solidFill>
+                        </a:rPr>
+                        <a:t>Contiv</a:t>
+                      </a:r>
+                      <a:r>
+                        <a:rPr lang="en-US" sz="1400" baseline="0" dirty="0" smtClean="0">
+                          <a:solidFill>
+                            <a:schemeClr val="accent6"/>
+                          </a:solidFill>
+                        </a:rPr>
+                        <a:t> plugin for now, Jeff/Bruce to investigate for more “real” solution moving forward</a:t>
+                      </a:r>
+                      <a:endParaRPr lang="en-US" sz="1400" dirty="0">
+                        <a:solidFill>
+                          <a:schemeClr val="accent6"/>
+                        </a:solidFill>
+                      </a:endParaRPr>
                     </a:p>
                   </a:txBody>
                   <a:tcPr/>
@@ -5309,7 +5624,19 @@
                     <a:bodyPr/>
                     <a:lstStyle/>
                     <a:p>
-                      <a:endParaRPr lang="en-US" sz="1400" dirty="0"/>
+                      <a:r>
+                        <a:rPr lang="en-US" sz="1400" dirty="0" smtClean="0">
+                          <a:solidFill>
+                            <a:schemeClr val="accent6"/>
+                          </a:solidFill>
+                        </a:rPr>
+                        <a:t>Kafka</a:t>
+                      </a:r>
+                      <a:endParaRPr lang="en-US" sz="1400" dirty="0">
+                        <a:solidFill>
+                          <a:schemeClr val="accent6"/>
+                        </a:solidFill>
+                      </a:endParaRPr>
                     </a:p>
                   </a:txBody>
                   <a:tcPr/>
@@ -5365,7 +5692,19 @@
                     <a:bodyPr/>
                     <a:lstStyle/>
                     <a:p>
-                      <a:endParaRPr lang="en-US" sz="1400" dirty="0"/>
+                      <a:r>
+                        <a:rPr lang="en-US" sz="1400" dirty="0" smtClean="0">
+                          <a:solidFill>
+                            <a:schemeClr val="accent6"/>
+                          </a:solidFill>
+                        </a:rPr>
+                        <a:t>TBD with input from Matt</a:t>
+                      </a:r>
+                      <a:endParaRPr lang="en-US" sz="1400" dirty="0">
+                        <a:solidFill>
+                          <a:schemeClr val="accent6"/>
+                        </a:solidFill>
+                      </a:endParaRPr>
                     </a:p>
                   </a:txBody>
                   <a:tcPr/>
@@ -5409,7 +5748,20 @@
                     <a:bodyPr/>
                     <a:lstStyle/>
                     <a:p>
-                      <a:endParaRPr lang="en-US" sz="1400" dirty="0"/>
+                      <a:r>
+                        <a:rPr lang="en-US" sz="1400" dirty="0" smtClean="0">
+                          <a:solidFill>
+                            <a:schemeClr val="accent6"/>
+                          </a:solidFill>
+                          <a:sym typeface="Wingdings"/>
+                        </a:rPr>
+                        <a:t></a:t>
+                      </a:r>
+                      <a:endParaRPr lang="en-US" sz="1400" dirty="0">
+                        <a:solidFill>
+                          <a:schemeClr val="accent6"/>
+                        </a:solidFill>
+                      </a:endParaRPr>
                     </a:p>
                   </a:txBody>
                   <a:tcPr/>
@@ -5453,7 +5805,27 @@
                     <a:bodyPr/>
                     <a:lstStyle/>
                     <a:p>
-                      <a:endParaRPr lang="en-US" sz="1400" dirty="0"/>
+                      <a:r>
+                        <a:rPr lang="en-US" sz="1400" dirty="0" smtClean="0">
+                          <a:solidFill>
+                            <a:schemeClr val="accent6"/>
+                          </a:solidFill>
+                        </a:rPr>
+                        <a:t>TBD, but somewhat</a:t>
+                      </a:r>
+                      <a:r>
+                        <a:rPr lang="en-US" sz="1400" baseline="0" dirty="0" smtClean="0">
+                          <a:solidFill>
+                            <a:schemeClr val="accent6"/>
+                          </a:solidFill>
+                        </a:rPr>
+                        <a:t> orthogonal</a:t>
+                      </a:r>
+                      <a:endParaRPr lang="en-US" sz="1400" dirty="0">
+                        <a:solidFill>
+                          <a:schemeClr val="accent6"/>
+                        </a:solidFill>
+                      </a:endParaRPr>
                     </a:p>
                   </a:txBody>
                   <a:tcPr/>
@@ -5493,6 +5865,15 @@
                     <a:bodyPr/>
                     <a:lstStyle/>
                     <a:p>
+                      <a:r>
+                        <a:rPr lang="en-US" sz="1400" dirty="0" smtClean="0">
+                          <a:solidFill>
+                            <a:schemeClr val="accent6"/>
+                          </a:solidFill>
+                          <a:sym typeface="Wingdings"/>
+                        </a:rPr>
+                        <a:t></a:t>
+                      </a:r>
                       <a:endParaRPr lang="en-US" sz="1400" dirty="0"/>
                     </a:p>
                   </a:txBody>
@@ -5537,6 +5918,14 @@
                     <a:bodyPr/>
                     <a:lstStyle/>
                     <a:p>
+                      <a:r>
+                        <a:rPr lang="en-US" sz="1400" dirty="0" smtClean="0"/>
+                        <a:t>TBD with input</a:t>
+                      </a:r>
+                      <a:r>
+                        <a:rPr lang="en-US" sz="1400" baseline="0" dirty="0" smtClean="0"/>
+                        <a:t> from Matt</a:t>
+                      </a:r>
                       <a:endParaRPr lang="en-US" sz="1400" dirty="0"/>
                     </a:p>
                   </a:txBody>
@@ -5577,7 +5966,59 @@
                     <a:bodyPr/>
                     <a:lstStyle/>
                     <a:p>
-                      <a:endParaRPr lang="en-US" sz="1400" dirty="0"/>
+                      <a:r>
+                        <a:rPr lang="en-US" sz="1400" dirty="0" smtClean="0">
+                          <a:solidFill>
+                            <a:schemeClr val="accent6"/>
+                          </a:solidFill>
+                        </a:rPr>
+                        <a:t>v6</a:t>
+                      </a:r>
+                      <a:r>
+                        <a:rPr lang="en-US" sz="1400" baseline="0" dirty="0" smtClean="0">
+                          <a:solidFill>
+                            <a:schemeClr val="accent6"/>
+                          </a:solidFill>
+                        </a:rPr>
+                        <a:t> for signaling, v4 in </a:t>
+                      </a:r>
+                      <a:r>
+                        <a:rPr lang="en-US" sz="1400" baseline="0" dirty="0" err="1" smtClean="0">
+                          <a:solidFill>
+                            <a:schemeClr val="accent6"/>
+                          </a:solidFill>
+                        </a:rPr>
+                        <a:t>dataplane</a:t>
+                      </a:r>
+                      <a:r>
+                        <a:rPr lang="en-US" sz="1400" baseline="0" dirty="0" smtClean="0">
+                          <a:solidFill>
+                            <a:schemeClr val="accent6"/>
+                          </a:solidFill>
+                        </a:rPr>
+                        <a:t> </a:t>
+                      </a:r>
+                      <a:r>
+                        <a:rPr lang="mr-IN" sz="1400" baseline="0" dirty="0" smtClean="0">
+                          <a:solidFill>
+                            <a:schemeClr val="accent6"/>
+                          </a:solidFill>
+                        </a:rPr>
+                        <a:t>–</a:t>
+                      </a:r>
+                      <a:r>
+                        <a:rPr lang="en-US" sz="1400" baseline="0" dirty="0" smtClean="0">
+                          <a:solidFill>
+                            <a:schemeClr val="accent6"/>
+                          </a:solidFill>
+                        </a:rPr>
+                        <a:t> requires IBC uplift potentially</a:t>
+                      </a:r>
+                      <a:endParaRPr lang="en-US" sz="1400" dirty="0">
+                        <a:solidFill>
+                          <a:schemeClr val="accent6"/>
+                        </a:solidFill>
+                      </a:endParaRPr>
                     </a:p>
                   </a:txBody>
                   <a:tcPr/>
@@ -5659,31 +6100,59 @@
                         <a:defRPr/>
                       </a:pPr>
                       <a:r>
-                        <a:rPr lang="en-US" sz="1400" dirty="0" smtClean="0"/>
+                        <a:rPr lang="en-US" sz="1400" dirty="0" smtClean="0">
+                          <a:solidFill>
+                            <a:schemeClr val="accent6"/>
+                          </a:solidFill>
+                        </a:rPr>
                         <a:t>Use </a:t>
                       </a:r>
                       <a:r>
-                        <a:rPr lang="en-US" sz="1400" dirty="0" err="1" smtClean="0"/>
+                        <a:rPr lang="en-US" sz="1400" dirty="0" err="1" smtClean="0">
+                          <a:solidFill>
+                            <a:schemeClr val="accent6"/>
+                          </a:solidFill>
+                        </a:rPr>
                         <a:t>wwwin-github.cisco.com</a:t>
                       </a:r>
                       <a:r>
-                        <a:rPr lang="en-US" sz="1400" dirty="0" smtClean="0"/>
+                        <a:rPr lang="en-US" sz="1400" dirty="0" smtClean="0">
+                          <a:solidFill>
+                            <a:schemeClr val="accent6"/>
+                          </a:solidFill>
+                        </a:rPr>
                         <a:t>/spa-</a:t>
                       </a:r>
                       <a:r>
-                        <a:rPr lang="en-US" sz="1400" dirty="0" err="1" smtClean="0"/>
+                        <a:rPr lang="en-US" sz="1400" dirty="0" err="1" smtClean="0">
+                          <a:solidFill>
+                            <a:schemeClr val="accent6"/>
+                          </a:solidFill>
+                        </a:rPr>
                         <a:t>ie</a:t>
                       </a:r>
                       <a:r>
-                        <a:rPr lang="en-US" sz="1400" dirty="0" smtClean="0"/>
+                        <a:rPr lang="en-US" sz="1400" dirty="0" smtClean="0">
+                          <a:solidFill>
+                            <a:schemeClr val="accent6"/>
+                          </a:solidFill>
+                        </a:rPr>
                         <a:t> for big things, Paul’s </a:t>
                       </a:r>
                       <a:r>
-                        <a:rPr lang="en-US" sz="1400" dirty="0" err="1" smtClean="0"/>
+                        <a:rPr lang="en-US" sz="1400" dirty="0" err="1" smtClean="0">
+                          <a:solidFill>
+                            <a:schemeClr val="accent6"/>
+                          </a:solidFill>
+                        </a:rPr>
                         <a:t>docwiki</a:t>
                       </a:r>
                       <a:r>
-                        <a:rPr lang="en-US" sz="1400" smtClean="0"/>
+                        <a:rPr lang="en-US" sz="1400" dirty="0" smtClean="0">
+                          <a:solidFill>
+                            <a:schemeClr val="accent6"/>
+                          </a:solidFill>
+                        </a:rPr>
                         <a:t> for documentation</a:t>
                       </a:r>
                     </a:p>

</xml_diff>

<commit_message>
Updated most answers to open questions for posterity
</commit_message>
<xml_diff>
--- a/docs/planning-kickoff.pptx
+++ b/docs/planning-kickoff.pptx
@@ -253,7 +253,7 @@
           <a:p>
             <a:fld id="{5EC02B15-C61A-C040-82F1-B1749DBDC6B0}" type="datetimeFigureOut">
               <a:rPr lang="en-US" smtClean="0"/>
-              <a:t>7/24/17</a:t>
+              <a:t>8/30/17</a:t>
             </a:fld>
             <a:endParaRPr lang="en-US"/>
           </a:p>
@@ -423,7 +423,7 @@
           <a:p>
             <a:fld id="{5EC02B15-C61A-C040-82F1-B1749DBDC6B0}" type="datetimeFigureOut">
               <a:rPr lang="en-US" smtClean="0"/>
-              <a:t>7/24/17</a:t>
+              <a:t>8/30/17</a:t>
             </a:fld>
             <a:endParaRPr lang="en-US"/>
           </a:p>
@@ -603,7 +603,7 @@
           <a:p>
             <a:fld id="{5EC02B15-C61A-C040-82F1-B1749DBDC6B0}" type="datetimeFigureOut">
               <a:rPr lang="en-US" smtClean="0"/>
-              <a:t>7/24/17</a:t>
+              <a:t>8/30/17</a:t>
             </a:fld>
             <a:endParaRPr lang="en-US"/>
           </a:p>
@@ -773,7 +773,7 @@
           <a:p>
             <a:fld id="{5EC02B15-C61A-C040-82F1-B1749DBDC6B0}" type="datetimeFigureOut">
               <a:rPr lang="en-US" smtClean="0"/>
-              <a:t>7/24/17</a:t>
+              <a:t>8/30/17</a:t>
             </a:fld>
             <a:endParaRPr lang="en-US"/>
           </a:p>
@@ -1019,7 +1019,7 @@
           <a:p>
             <a:fld id="{5EC02B15-C61A-C040-82F1-B1749DBDC6B0}" type="datetimeFigureOut">
               <a:rPr lang="en-US" smtClean="0"/>
-              <a:t>7/24/17</a:t>
+              <a:t>8/30/17</a:t>
             </a:fld>
             <a:endParaRPr lang="en-US"/>
           </a:p>
@@ -1251,7 +1251,7 @@
           <a:p>
             <a:fld id="{5EC02B15-C61A-C040-82F1-B1749DBDC6B0}" type="datetimeFigureOut">
               <a:rPr lang="en-US" smtClean="0"/>
-              <a:t>7/24/17</a:t>
+              <a:t>8/30/17</a:t>
             </a:fld>
             <a:endParaRPr lang="en-US"/>
           </a:p>
@@ -1618,7 +1618,7 @@
           <a:p>
             <a:fld id="{5EC02B15-C61A-C040-82F1-B1749DBDC6B0}" type="datetimeFigureOut">
               <a:rPr lang="en-US" smtClean="0"/>
-              <a:t>7/24/17</a:t>
+              <a:t>8/30/17</a:t>
             </a:fld>
             <a:endParaRPr lang="en-US"/>
           </a:p>
@@ -1736,7 +1736,7 @@
           <a:p>
             <a:fld id="{5EC02B15-C61A-C040-82F1-B1749DBDC6B0}" type="datetimeFigureOut">
               <a:rPr lang="en-US" smtClean="0"/>
-              <a:t>7/24/17</a:t>
+              <a:t>8/30/17</a:t>
             </a:fld>
             <a:endParaRPr lang="en-US"/>
           </a:p>
@@ -1831,7 +1831,7 @@
           <a:p>
             <a:fld id="{5EC02B15-C61A-C040-82F1-B1749DBDC6B0}" type="datetimeFigureOut">
               <a:rPr lang="en-US" smtClean="0"/>
-              <a:t>7/24/17</a:t>
+              <a:t>8/30/17</a:t>
             </a:fld>
             <a:endParaRPr lang="en-US"/>
           </a:p>
@@ -2108,7 +2108,7 @@
           <a:p>
             <a:fld id="{5EC02B15-C61A-C040-82F1-B1749DBDC6B0}" type="datetimeFigureOut">
               <a:rPr lang="en-US" smtClean="0"/>
-              <a:t>7/24/17</a:t>
+              <a:t>8/30/17</a:t>
             </a:fld>
             <a:endParaRPr lang="en-US"/>
           </a:p>
@@ -2361,7 +2361,7 @@
           <a:p>
             <a:fld id="{5EC02B15-C61A-C040-82F1-B1749DBDC6B0}" type="datetimeFigureOut">
               <a:rPr lang="en-US" smtClean="0"/>
-              <a:t>7/24/17</a:t>
+              <a:t>8/30/17</a:t>
             </a:fld>
             <a:endParaRPr lang="en-US"/>
           </a:p>
@@ -2574,7 +2574,7 @@
           <a:p>
             <a:fld id="{5EC02B15-C61A-C040-82F1-B1749DBDC6B0}" type="datetimeFigureOut">
               <a:rPr lang="en-US" smtClean="0"/>
-              <a:t>7/24/17</a:t>
+              <a:t>8/30/17</a:t>
             </a:fld>
             <a:endParaRPr lang="en-US"/>
           </a:p>
@@ -4293,7 +4293,6 @@
               <a:rPr lang="en-US" sz="1200" dirty="0" smtClean="0"/>
               <a:t>IBC Demo</a:t>
             </a:r>
-            <a:endParaRPr lang="en-US" sz="1200" dirty="0" smtClean="0"/>
           </a:p>
           <a:p>
             <a:pPr algn="ctr"/>
@@ -4559,17 +4558,12 @@
               <a:rPr lang="en-US" sz="1200" dirty="0" smtClean="0"/>
               <a:t>SR Summit</a:t>
             </a:r>
-            <a:endParaRPr lang="en-US" sz="1200" dirty="0" smtClean="0"/>
           </a:p>
           <a:p>
             <a:pPr algn="ctr"/>
             <a:r>
               <a:rPr lang="en-US" sz="1200" dirty="0" smtClean="0"/>
-              <a:t>(</a:t>
-            </a:r>
-            <a:r>
-              <a:rPr lang="en-US" sz="1200" dirty="0" smtClean="0"/>
-              <a:t>9/20-21)</a:t>
+              <a:t>(9/20-21)</a:t>
             </a:r>
             <a:endParaRPr lang="en-US" sz="1200" dirty="0"/>
           </a:p>
@@ -4645,7 +4639,7 @@
             <p:ph idx="1"/>
             <p:extLst>
               <p:ext uri="{D42A27DB-BD31-4B8C-83A1-F6EECF244321}">
-                <p14:modId xmlns:p14="http://schemas.microsoft.com/office/powerpoint/2010/main" val="842284308"/>
+                <p14:modId xmlns:p14="http://schemas.microsoft.com/office/powerpoint/2010/main" val="148996675"/>
               </p:ext>
             </p:extLst>
           </p:nvPr>
@@ -4927,7 +4921,7 @@
                             <a:schemeClr val="accent6"/>
                           </a:solidFill>
                         </a:rPr>
-                        <a:t>IBC Demo and DC BAF balancer</a:t>
+                        <a:t>Espresso-style EPE: “French Press”</a:t>
                       </a:r>
                       <a:endParaRPr lang="en-US" sz="1400" dirty="0">
                         <a:solidFill>
@@ -5198,11 +5192,7 @@
                       </a:r>
                       <a:r>
                         <a:rPr lang="en-US" sz="1400" baseline="0" dirty="0" smtClean="0"/>
-                        <a:t> 16 cores and however much memory makes sense based on VM </a:t>
-                      </a:r>
-                      <a:r>
-                        <a:rPr lang="en-US" sz="1400" baseline="0" dirty="0" smtClean="0"/>
-                        <a:t>sizing on chosen platform.</a:t>
+                        <a:t> 16 cores and however much memory makes sense based on VM sizing on chosen platform.</a:t>
                       </a:r>
                       <a:endParaRPr lang="en-US" sz="1400" dirty="0"/>
                     </a:p>
@@ -5274,6 +5264,14 @@
                     <a:bodyPr/>
                     <a:lstStyle/>
                     <a:p>
+                      <a:r>
+                        <a:rPr lang="en-US" sz="1400" dirty="0" smtClean="0"/>
+                        <a:t>(Staffing</a:t>
+                      </a:r>
+                      <a:r>
+                        <a:rPr lang="en-US" sz="1400" baseline="0" dirty="0" smtClean="0"/>
+                        <a:t> in different doc)</a:t>
+                      </a:r>
                       <a:endParaRPr lang="en-US" sz="1400" dirty="0"/>
                     </a:p>
                   </a:txBody>
@@ -5328,15 +5326,15 @@
                             <a:schemeClr val="accent6"/>
                           </a:solidFill>
                         </a:rPr>
-                        <a:t>2 weeks</a:t>
-                      </a:r>
-                      <a:r>
-                        <a:rPr lang="en-US" sz="1400" baseline="0" dirty="0" smtClean="0">
+                        <a:t>2 </a:t>
+                      </a:r>
+                      <a:r>
+                        <a:rPr lang="en-US" sz="1400" dirty="0" smtClean="0">
                           <a:solidFill>
                             <a:schemeClr val="accent6"/>
                           </a:solidFill>
                         </a:rPr>
-                        <a:t> suggested</a:t>
+                        <a:t>weeks</a:t>
                       </a:r>
                       <a:endParaRPr lang="en-US" sz="1400" dirty="0">
                         <a:solidFill>
@@ -5422,14 +5420,14 @@
             <p:ph idx="1"/>
             <p:extLst>
               <p:ext uri="{D42A27DB-BD31-4B8C-83A1-F6EECF244321}">
-                <p14:modId xmlns:p14="http://schemas.microsoft.com/office/powerpoint/2010/main" val="1115057187"/>
+                <p14:modId xmlns:p14="http://schemas.microsoft.com/office/powerpoint/2010/main" val="1588786600"/>
               </p:ext>
             </p:extLst>
           </p:nvPr>
         </p:nvGraphicFramePr>
         <p:xfrm>
           <a:off x="838200" y="1001950"/>
-          <a:ext cx="10515600" cy="5593080"/>
+          <a:ext cx="10515600" cy="5791716"/>
         </p:xfrm>
         <a:graphic>
           <a:graphicData uri="http://schemas.openxmlformats.org/drawingml/2006/table">
@@ -5442,7 +5440,7 @@
                 <a:gridCol w="3505200"/>
                 <a:gridCol w="3505200"/>
               </a:tblGrid>
-              <a:tr h="370840">
+              <a:tr h="365932">
                 <a:tc>
                   <a:txBody>
                     <a:bodyPr/>
@@ -5490,7 +5488,7 @@
                   <a:tcPr/>
                 </a:tc>
               </a:tr>
-              <a:tr h="370840">
+              <a:tr h="1353446">
                 <a:tc>
                   <a:txBody>
                     <a:bodyPr/>
@@ -5590,7 +5588,7 @@
                   <a:tcPr/>
                 </a:tc>
               </a:tr>
-              <a:tr h="370840">
+              <a:tr h="365932">
                 <a:tc>
                   <a:txBody>
                     <a:bodyPr/>
@@ -5642,7 +5640,7 @@
                   <a:tcPr/>
                 </a:tc>
               </a:tr>
-              <a:tr h="370840">
+              <a:tr h="511302">
                 <a:tc>
                   <a:txBody>
                     <a:bodyPr/>
@@ -5693,12 +5691,44 @@
                     <a:lstStyle/>
                     <a:p>
                       <a:r>
+                        <a:rPr lang="en-US" sz="1400" dirty="0" err="1" smtClean="0">
+                          <a:solidFill>
+                            <a:schemeClr val="accent6"/>
+                          </a:solidFill>
+                        </a:rPr>
+                        <a:t>ArangoDB</a:t>
+                      </a:r>
+                      <a:r>
                         <a:rPr lang="en-US" sz="1400" dirty="0" smtClean="0">
                           <a:solidFill>
                             <a:schemeClr val="accent6"/>
                           </a:solidFill>
                         </a:rPr>
-                        <a:t>TBD with input from Matt</a:t>
+                        <a:t> as</a:t>
+                      </a:r>
+                      <a:r>
+                        <a:rPr lang="en-US" sz="1400" baseline="0" dirty="0" smtClean="0">
+                          <a:solidFill>
+                            <a:schemeClr val="accent6"/>
+                          </a:solidFill>
+                        </a:rPr>
+                        <a:t> </a:t>
+                      </a:r>
+                      <a:r>
+                        <a:rPr lang="en-US" sz="1400" baseline="0" dirty="0" err="1" smtClean="0">
+                          <a:solidFill>
+                            <a:schemeClr val="accent6"/>
+                          </a:solidFill>
+                        </a:rPr>
+                        <a:t>graphDB</a:t>
+                      </a:r>
+                      <a:r>
+                        <a:rPr lang="en-US" sz="1400" baseline="0" dirty="0" smtClean="0">
+                          <a:solidFill>
+                            <a:schemeClr val="accent6"/>
+                          </a:solidFill>
+                        </a:rPr>
+                        <a:t>, TSDB TBD</a:t>
                       </a:r>
                       <a:endParaRPr lang="en-US" sz="1400" dirty="0">
                         <a:solidFill>
@@ -5710,7 +5740,7 @@
                   <a:tcPr/>
                 </a:tc>
               </a:tr>
-              <a:tr h="370840">
+              <a:tr h="511302">
                 <a:tc>
                   <a:txBody>
                     <a:bodyPr/>
@@ -5755,7 +5785,7 @@
                           </a:solidFill>
                           <a:sym typeface="Wingdings"/>
                         </a:rPr>
-                        <a:t></a:t>
+                        <a:t>, but limit external communication until later time</a:t>
                       </a:r>
                       <a:endParaRPr lang="en-US" sz="1400" dirty="0">
                         <a:solidFill>
@@ -5767,7 +5797,7 @@
                   <a:tcPr/>
                 </a:tc>
               </a:tr>
-              <a:tr h="370840">
+              <a:tr h="365932">
                 <a:tc>
                   <a:txBody>
                     <a:bodyPr/>
@@ -5806,20 +5836,20 @@
                     <a:lstStyle/>
                     <a:p>
                       <a:r>
+                        <a:rPr lang="en-US" sz="1400" dirty="0" err="1" smtClean="0">
+                          <a:solidFill>
+                            <a:schemeClr val="accent6"/>
+                          </a:solidFill>
+                        </a:rPr>
+                        <a:t>HeapsterDB</a:t>
+                      </a:r>
+                      <a:r>
                         <a:rPr lang="en-US" sz="1400" dirty="0" smtClean="0">
                           <a:solidFill>
                             <a:schemeClr val="accent6"/>
                           </a:solidFill>
                         </a:rPr>
-                        <a:t>TBD, but somewhat</a:t>
-                      </a:r>
-                      <a:r>
-                        <a:rPr lang="en-US" sz="1400" baseline="0" dirty="0" smtClean="0">
-                          <a:solidFill>
-                            <a:schemeClr val="accent6"/>
-                          </a:solidFill>
-                        </a:rPr>
-                        <a:t> orthogonal</a:t>
+                        <a:t> for monitoring k8s</a:t>
                       </a:r>
                       <a:endParaRPr lang="en-US" sz="1400" dirty="0">
                         <a:solidFill>
@@ -5831,7 +5861,7 @@
                   <a:tcPr/>
                 </a:tc>
               </a:tr>
-              <a:tr h="370840">
+              <a:tr h="511302">
                 <a:tc>
                   <a:txBody>
                     <a:bodyPr/>
@@ -5880,7 +5910,7 @@
                   <a:tcPr/>
                 </a:tc>
               </a:tr>
-              <a:tr h="370840">
+              <a:tr h="511302">
                 <a:tc>
                   <a:txBody>
                     <a:bodyPr/>
@@ -5920,11 +5950,19 @@
                     <a:p>
                       <a:r>
                         <a:rPr lang="en-US" sz="1400" dirty="0" smtClean="0"/>
-                        <a:t>TBD with input</a:t>
+                        <a:t>Mostly Go.</a:t>
                       </a:r>
                       <a:r>
                         <a:rPr lang="en-US" sz="1400" baseline="0" dirty="0" smtClean="0"/>
-                        <a:t> from Matt</a:t>
+                        <a:t>  See </a:t>
+                      </a:r>
+                      <a:r>
+                        <a:rPr lang="en-US" sz="1400" baseline="0" dirty="0" err="1" smtClean="0"/>
+                        <a:t>github</a:t>
+                      </a:r>
+                      <a:r>
+                        <a:rPr lang="en-US" sz="1400" baseline="0" dirty="0" smtClean="0"/>
+                        <a:t> repo for docs.</a:t>
                       </a:r>
                       <a:endParaRPr lang="en-US" sz="1400" dirty="0"/>
                     </a:p>
@@ -5932,7 +5970,7 @@
                   <a:tcPr/>
                 </a:tc>
               </a:tr>
-              <a:tr h="370840">
+              <a:tr h="511302">
                 <a:tc>
                   <a:txBody>
                     <a:bodyPr/>
@@ -6024,7 +6062,7 @@
                   <a:tcPr/>
                 </a:tc>
               </a:tr>
-              <a:tr h="370840">
+              <a:tr h="721838">
                 <a:tc>
                   <a:txBody>
                     <a:bodyPr/>
@@ -6153,8 +6191,38 @@
                             <a:schemeClr val="accent6"/>
                           </a:solidFill>
                         </a:rPr>
-                        <a:t> for documentation</a:t>
-                      </a:r>
+                        <a:t> for </a:t>
+                      </a:r>
+                      <a:r>
+                        <a:rPr lang="en-US" sz="1400" dirty="0" smtClean="0">
+                          <a:solidFill>
+                            <a:schemeClr val="accent6"/>
+                          </a:solidFill>
+                        </a:rPr>
+                        <a:t>documentation, </a:t>
+                      </a:r>
+                      <a:r>
+                        <a:rPr lang="en-US" sz="1400" dirty="0" smtClean="0">
+                          <a:solidFill>
+                            <a:schemeClr val="accent6"/>
+                          </a:solidFill>
+                          <a:hlinkClick r:id="rId2"/>
+                        </a:rPr>
+                        <a:t>voltron-team@cisco.com</a:t>
+                      </a:r>
+                      <a:r>
+                        <a:rPr lang="en-US" sz="1400" baseline="0" dirty="0" smtClean="0">
+                          <a:solidFill>
+                            <a:schemeClr val="accent6"/>
+                          </a:solidFill>
+                        </a:rPr>
+                        <a:t> for mailer</a:t>
+                      </a:r>
+                      <a:endParaRPr lang="en-US" sz="1400" dirty="0" smtClean="0">
+                        <a:solidFill>
+                          <a:schemeClr val="accent6"/>
+                        </a:solidFill>
+                      </a:endParaRPr>
                     </a:p>
                   </a:txBody>
                   <a:tcPr/>

</xml_diff>